<commit_message>
add 3colorSAT/pptx 3color-crossover.pptx, delete gray-edges-old.pttx
</commit_message>
<xml_diff>
--- a/fall17/slidesF17/gray-edges.pptx
+++ b/fall17/slidesF17/gray-edges.pptx
@@ -4178,7 +4178,7 @@
           <a:graphicData uri="http://schemas.openxmlformats.org/presentationml/2006/ole">
             <mc:AlternateContent xmlns:mc="http://schemas.openxmlformats.org/markup-compatibility/2006">
               <mc:Choice xmlns:v="urn:schemas-microsoft-com:vml" Requires="v">
-                <p:oleObj spid="_x0000_s1037" name="Equation" r:id="rId3" imgW="635000" imgH="228600" progId="Equation.DSMT4">
+                <p:oleObj spid="_x0000_s1039" name="Equation" r:id="rId3" imgW="635000" imgH="228600" progId="Equation.DSMT4">
                   <p:embed/>
                 </p:oleObj>
               </mc:Choice>
@@ -4744,7 +4744,7 @@
           <a:graphicData uri="http://schemas.openxmlformats.org/presentationml/2006/ole">
             <mc:AlternateContent xmlns:mc="http://schemas.openxmlformats.org/markup-compatibility/2006">
               <mc:Choice xmlns:v="urn:schemas-microsoft-com:vml" Requires="v">
-                <p:oleObj spid="_x0000_s54282" name="Equation" r:id="rId3" imgW="635000" imgH="228600" progId="Equation.DSMT4">
+                <p:oleObj spid="_x0000_s54284" name="Equation" r:id="rId3" imgW="635000" imgH="228600" progId="Equation.DSMT4">
                   <p:embed/>
                 </p:oleObj>
               </mc:Choice>
@@ -5401,7 +5401,7 @@
           <a:graphicData uri="http://schemas.openxmlformats.org/presentationml/2006/ole">
             <mc:AlternateContent xmlns:mc="http://schemas.openxmlformats.org/markup-compatibility/2006">
               <mc:Choice xmlns:v="urn:schemas-microsoft-com:vml" Requires="v">
-                <p:oleObj spid="_x0000_s48153" name="Equation" r:id="rId3" imgW="635000" imgH="228600" progId="Equation.DSMT4">
+                <p:oleObj spid="_x0000_s48155" name="Equation" r:id="rId3" imgW="635000" imgH="228600" progId="Equation.DSMT4">
                   <p:embed/>
                 </p:oleObj>
               </mc:Choice>
@@ -5938,7 +5938,7 @@
           <a:graphicData uri="http://schemas.openxmlformats.org/presentationml/2006/ole">
             <mc:AlternateContent xmlns:mc="http://schemas.openxmlformats.org/markup-compatibility/2006">
               <mc:Choice xmlns:v="urn:schemas-microsoft-com:vml" Requires="v">
-                <p:oleObj spid="_x0000_s41000" name="Equation" r:id="rId3" imgW="1117600" imgH="152400" progId="Equation.DSMT4">
+                <p:oleObj spid="_x0000_s41003" name="Equation" r:id="rId3" imgW="1117600" imgH="152400" progId="Equation.DSMT4">
                   <p:embed/>
                 </p:oleObj>
               </mc:Choice>
@@ -5995,7 +5995,7 @@
           <a:graphicData uri="http://schemas.openxmlformats.org/presentationml/2006/ole">
             <mc:AlternateContent xmlns:mc="http://schemas.openxmlformats.org/markup-compatibility/2006">
               <mc:Choice xmlns:v="urn:schemas-microsoft-com:vml" Requires="v">
-                <p:oleObj spid="_x0000_s41001" name="Equation" r:id="rId5" imgW="889000" imgH="228600" progId="Equation.DSMT4">
+                <p:oleObj spid="_x0000_s41004" name="Equation" r:id="rId5" imgW="889000" imgH="228600" progId="Equation.DSMT4">
                   <p:embed/>
                 </p:oleObj>
               </mc:Choice>
@@ -17993,7 +17993,7 @@
           <a:graphicData uri="http://schemas.openxmlformats.org/presentationml/2006/ole">
             <mc:AlternateContent xmlns:mc="http://schemas.openxmlformats.org/markup-compatibility/2006">
               <mc:Choice xmlns:v="urn:schemas-microsoft-com:vml" Requires="v">
-                <p:oleObj spid="_x0000_s42007" name="Equation" r:id="rId3" imgW="393700" imgH="228600" progId="Equation.DSMT4">
+                <p:oleObj spid="_x0000_s42009" name="Equation" r:id="rId3" imgW="393700" imgH="228600" progId="Equation.DSMT4">
                   <p:embed/>
                 </p:oleObj>
               </mc:Choice>
@@ -21001,7 +21001,7 @@
           <a:graphicData uri="http://schemas.openxmlformats.org/presentationml/2006/ole">
             <mc:AlternateContent xmlns:mc="http://schemas.openxmlformats.org/markup-compatibility/2006">
               <mc:Choice xmlns:v="urn:schemas-microsoft-com:vml" Requires="v">
-                <p:oleObj spid="_x0000_s43031" name="Equation" r:id="rId3" imgW="635000" imgH="228600" progId="Equation.DSMT4">
+                <p:oleObj spid="_x0000_s43033" name="Equation" r:id="rId3" imgW="635000" imgH="228600" progId="Equation.DSMT4">
                   <p:embed/>
                 </p:oleObj>
               </mc:Choice>
@@ -21424,7 +21424,7 @@
             <a:graphicData uri="http://schemas.openxmlformats.org/presentationml/2006/ole">
               <mc:AlternateContent xmlns:mc="http://schemas.openxmlformats.org/markup-compatibility/2006">
                 <mc:Choice xmlns:v="urn:schemas-microsoft-com:vml" Requires="v">
-                  <p:oleObj spid="_x0000_s44055" name="Equation" r:id="rId3" imgW="635000" imgH="228600" progId="Equation.DSMT4">
+                  <p:oleObj spid="_x0000_s44057" name="Equation" r:id="rId3" imgW="635000" imgH="228600" progId="Equation.DSMT4">
                     <p:embed/>
                   </p:oleObj>
                 </mc:Choice>
@@ -23657,7 +23657,7 @@
           <a:graphicData uri="http://schemas.openxmlformats.org/presentationml/2006/ole">
             <mc:AlternateContent xmlns:mc="http://schemas.openxmlformats.org/markup-compatibility/2006">
               <mc:Choice xmlns:v="urn:schemas-microsoft-com:vml" Requires="v">
-                <p:oleObj spid="_x0000_s46103" name="Equation" r:id="rId3" imgW="635000" imgH="228600" progId="Equation.DSMT4">
+                <p:oleObj spid="_x0000_s46105" name="Equation" r:id="rId3" imgW="635000" imgH="228600" progId="Equation.DSMT4">
                   <p:embed/>
                 </p:oleObj>
               </mc:Choice>

</xml_diff>

<commit_message>
add ps7, edit gray-edges.pptx
</commit_message>
<xml_diff>
--- a/fall17/slidesF17/gray-edges.pptx
+++ b/fall17/slidesF17/gray-edges.pptx
@@ -22,8 +22,8 @@
     <p:sldId id="706" r:id="rId10"/>
     <p:sldId id="677" r:id="rId11"/>
     <p:sldId id="708" r:id="rId12"/>
-    <p:sldId id="710" r:id="rId13"/>
-    <p:sldId id="705" r:id="rId14"/>
+    <p:sldId id="705" r:id="rId13"/>
+    <p:sldId id="711" r:id="rId14"/>
     <p:sldId id="695" r:id="rId15"/>
     <p:sldId id="696" r:id="rId16"/>
     <p:sldId id="697" r:id="rId17"/>
@@ -3376,7 +3376,7 @@
             <a:r>
               <a:rPr lang="en-US" dirty="0">
                 <a:solidFill>
-                  <a:srgbClr val="FF00FF"/>
+                  <a:schemeClr val="tx1"/>
                 </a:solidFill>
               </a:rPr>
               <a:t>Lemma</a:t>
@@ -4005,7 +4005,15 @@
                   <a:srgbClr val="FF00FF"/>
                 </a:solidFill>
               </a:rPr>
-              <a:t>Swap Lemma</a:t>
+              <a:t>Swap </a:t>
+            </a:r>
+            <a:r>
+              <a:rPr lang="en-US" dirty="0">
+                <a:solidFill>
+                  <a:srgbClr val="000000"/>
+                </a:solidFill>
+              </a:rPr>
+              <a:t>Lemma</a:t>
             </a:r>
           </a:p>
         </p:txBody>
@@ -4178,7 +4186,7 @@
           <a:graphicData uri="http://schemas.openxmlformats.org/presentationml/2006/ole">
             <mc:AlternateContent xmlns:mc="http://schemas.openxmlformats.org/markup-compatibility/2006">
               <mc:Choice xmlns:v="urn:schemas-microsoft-com:vml" Requires="v">
-                <p:oleObj spid="_x0000_s1041" name="Equation" r:id="rId3" imgW="635000" imgH="228600" progId="Equation.DSMT4">
+                <p:oleObj spid="_x0000_s1045" name="Equation" r:id="rId3" imgW="635000" imgH="228600" progId="Equation.DSMT4">
                   <p:embed/>
                 </p:oleObj>
               </mc:Choice>
@@ -4365,736 +4373,6 @@
 </file>
 
 <file path=ppt/slides/slide12.xml><?xml version="1.0" encoding="utf-8"?>
-<p:sld xmlns:a="http://schemas.openxmlformats.org/drawingml/2006/main" xmlns:r="http://schemas.openxmlformats.org/officeDocument/2006/relationships" xmlns:p="http://schemas.openxmlformats.org/presentationml/2006/main" show="0">
-  <p:cSld>
-    <p:spTree>
-      <p:nvGrpSpPr>
-        <p:cNvPr id="1" name=""/>
-        <p:cNvGrpSpPr/>
-        <p:nvPr/>
-      </p:nvGrpSpPr>
-      <p:grpSpPr>
-        <a:xfrm>
-          <a:off x="0" y="0"/>
-          <a:ext cx="0" cy="0"/>
-          <a:chOff x="0" y="0"/>
-          <a:chExt cx="0" cy="0"/>
-        </a:xfrm>
-      </p:grpSpPr>
-      <p:sp>
-        <p:nvSpPr>
-          <p:cNvPr id="2" name="Title 1"/>
-          <p:cNvSpPr>
-            <a:spLocks noGrp="1"/>
-          </p:cNvSpPr>
-          <p:nvPr>
-            <p:ph type="title"/>
-          </p:nvPr>
-        </p:nvSpPr>
-        <p:spPr/>
-        <p:txBody>
-          <a:bodyPr/>
-          <a:lstStyle/>
-          <a:p>
-            <a:r>
-              <a:rPr lang="en-US" dirty="0" smtClean="0"/>
-              <a:t>Gray Edge </a:t>
-            </a:r>
-            <a:r>
-              <a:rPr lang="en-US" dirty="0"/>
-              <a:t>Swap Lemma</a:t>
-            </a:r>
-          </a:p>
-        </p:txBody>
-      </p:sp>
-      <p:sp>
-        <p:nvSpPr>
-          <p:cNvPr id="3" name="Content Placeholder 2"/>
-          <p:cNvSpPr>
-            <a:spLocks noGrp="1"/>
-          </p:cNvSpPr>
-          <p:nvPr>
-            <p:ph idx="1"/>
-          </p:nvPr>
-        </p:nvSpPr>
-        <p:spPr>
-          <a:xfrm>
-            <a:off x="152400" y="1295400"/>
-            <a:ext cx="8915400" cy="5181600"/>
-          </a:xfrm>
-        </p:spPr>
-        <p:txBody>
-          <a:bodyPr/>
-          <a:lstStyle/>
-          <a:p>
-            <a:r>
-              <a:rPr lang="en-US" sz="5400" dirty="0" smtClean="0"/>
-              <a:t>Suppose </a:t>
-            </a:r>
-            <a:r>
-              <a:rPr lang="en-US" sz="5400" b="1" i="1" dirty="0" smtClean="0">
-                <a:ln w="12700">
-                  <a:solidFill>
-                    <a:schemeClr val="tx2">
-                      <a:satMod val="155000"/>
-                    </a:schemeClr>
-                  </a:solidFill>
-                  <a:prstDash val="solid"/>
-                </a:ln>
-                <a:solidFill>
-                  <a:schemeClr val="bg2">
-                    <a:tint val="85000"/>
-                    <a:satMod val="155000"/>
-                  </a:schemeClr>
-                </a:solidFill>
-                <a:effectLst>
-                  <a:outerShdw blurRad="41275" dist="20320" dir="1800000" algn="tl" rotWithShape="0">
-                    <a:srgbClr val="000000">
-                      <a:alpha val="40000"/>
-                    </a:srgbClr>
-                  </a:outerShdw>
-                </a:effectLst>
-                <a:latin typeface="PT Serif"/>
-                <a:cs typeface="PT Serif"/>
-              </a:rPr>
-              <a:t>e</a:t>
-            </a:r>
-            <a:r>
-              <a:rPr lang="en-US" sz="5400" dirty="0" smtClean="0"/>
-              <a:t> </a:t>
-            </a:r>
-            <a:r>
-              <a:rPr lang="en-US" sz="5400" dirty="0">
-                <a:solidFill>
-                  <a:srgbClr val="FF0000"/>
-                </a:solidFill>
-              </a:rPr>
-              <a:t>not</a:t>
-            </a:r>
-            <a:r>
-              <a:rPr lang="en-US" sz="5400" dirty="0"/>
-              <a:t> an </a:t>
-            </a:r>
-            <a:r>
-              <a:rPr lang="en-US" sz="5400" dirty="0" smtClean="0"/>
-              <a:t>edge of </a:t>
-            </a:r>
-          </a:p>
-          <a:p>
-            <a:r>
-              <a:rPr lang="en-US" sz="5400" dirty="0" err="1" smtClean="0">
-                <a:solidFill>
-                  <a:srgbClr val="008000"/>
-                </a:solidFill>
-              </a:rPr>
-              <a:t>css</a:t>
-            </a:r>
-            <a:r>
-              <a:rPr lang="en-US" sz="5400" dirty="0" smtClean="0"/>
-              <a:t> </a:t>
-            </a:r>
-            <a:r>
-              <a:rPr lang="en-US" sz="5400" dirty="0" smtClean="0">
-                <a:solidFill>
-                  <a:srgbClr val="0000E5"/>
-                </a:solidFill>
-              </a:rPr>
-              <a:t>C</a:t>
-            </a:r>
-            <a:r>
-              <a:rPr lang="en-US" sz="5400" dirty="0" smtClean="0"/>
-              <a:t>. Then there is </a:t>
-            </a:r>
-            <a:r>
-              <a:rPr lang="en-US" sz="5400" dirty="0"/>
-              <a:t>edge </a:t>
-            </a:r>
-            <a:endParaRPr lang="en-US" sz="5400" dirty="0" smtClean="0"/>
-          </a:p>
-          <a:p>
-            <a:r>
-              <a:rPr lang="en-US" sz="4800" dirty="0" smtClean="0">
-                <a:solidFill>
-                  <a:schemeClr val="accent1">
-                    <a:lumMod val="50000"/>
-                  </a:schemeClr>
-                </a:solidFill>
-              </a:rPr>
-              <a:t>g</a:t>
-            </a:r>
-            <a:r>
-              <a:rPr lang="en-US" sz="5400" dirty="0" smtClean="0"/>
-              <a:t> of </a:t>
-            </a:r>
-            <a:r>
-              <a:rPr lang="en-US" sz="4800" dirty="0">
-                <a:solidFill>
-                  <a:srgbClr val="0000E5"/>
-                </a:solidFill>
-              </a:rPr>
-              <a:t>C</a:t>
-            </a:r>
-            <a:r>
-              <a:rPr lang="en-US" sz="5400" dirty="0" smtClean="0"/>
-              <a:t>:</a:t>
-            </a:r>
-          </a:p>
-          <a:p>
-            <a:r>
-              <a:rPr lang="en-US" sz="5400" dirty="0" smtClean="0"/>
-              <a:t>   (</a:t>
-            </a:r>
-            <a:r>
-              <a:rPr lang="en-US" sz="5400" dirty="0" err="1"/>
-              <a:t>i</a:t>
-            </a:r>
-            <a:r>
-              <a:rPr lang="en-US" sz="5400" dirty="0"/>
-              <a:t>) </a:t>
-            </a:r>
-            <a:r>
-              <a:rPr lang="en-US" sz="5400" dirty="0" err="1">
-                <a:solidFill>
-                  <a:srgbClr val="0000F1"/>
-                </a:solidFill>
-              </a:rPr>
-              <a:t>wt</a:t>
-            </a:r>
-            <a:r>
-              <a:rPr lang="en-US" sz="5400" dirty="0">
-                <a:solidFill>
-                  <a:srgbClr val="0000F1"/>
-                </a:solidFill>
-              </a:rPr>
-              <a:t>(</a:t>
-            </a:r>
-            <a:r>
-              <a:rPr lang="en-US" sz="5400" b="1" i="1" dirty="0">
-                <a:ln w="12700">
-                  <a:solidFill>
-                    <a:schemeClr val="tx2">
-                      <a:satMod val="155000"/>
-                    </a:schemeClr>
-                  </a:solidFill>
-                  <a:prstDash val="solid"/>
-                </a:ln>
-                <a:solidFill>
-                  <a:schemeClr val="bg2">
-                    <a:tint val="85000"/>
-                    <a:satMod val="155000"/>
-                  </a:schemeClr>
-                </a:solidFill>
-                <a:effectLst>
-                  <a:outerShdw blurRad="41275" dist="20320" dir="1800000" algn="tl" rotWithShape="0">
-                    <a:srgbClr val="000000">
-                      <a:alpha val="40000"/>
-                    </a:srgbClr>
-                  </a:outerShdw>
-                </a:effectLst>
-                <a:latin typeface="PT Serif"/>
-                <a:cs typeface="PT Serif"/>
-              </a:rPr>
-              <a:t>e</a:t>
-            </a:r>
-            <a:r>
-              <a:rPr lang="en-US" sz="5400" dirty="0">
-                <a:solidFill>
-                  <a:srgbClr val="0000F1"/>
-                </a:solidFill>
-              </a:rPr>
-              <a:t>) </a:t>
-            </a:r>
-            <a:r>
-              <a:rPr lang="en-US" sz="5400" b="1" dirty="0">
-                <a:solidFill>
-                  <a:srgbClr val="0000F1"/>
-                </a:solidFill>
-                <a:latin typeface="Euclid Symbol" charset="2"/>
-                <a:cs typeface="Euclid Symbol" charset="2"/>
-              </a:rPr>
-              <a:t>&lt; </a:t>
-            </a:r>
-            <a:r>
-              <a:rPr lang="en-US" sz="5400" dirty="0" err="1">
-                <a:solidFill>
-                  <a:srgbClr val="0000F1"/>
-                </a:solidFill>
-              </a:rPr>
-              <a:t>wt</a:t>
-            </a:r>
-            <a:r>
-              <a:rPr lang="en-US" sz="5400" dirty="0">
-                <a:solidFill>
-                  <a:srgbClr val="0000F1"/>
-                </a:solidFill>
-              </a:rPr>
-              <a:t>(g)</a:t>
-            </a:r>
-          </a:p>
-          <a:p>
-            <a:r>
-              <a:rPr lang="en-US" sz="4800" dirty="0" smtClean="0"/>
-              <a:t>   (</a:t>
-            </a:r>
-            <a:r>
-              <a:rPr lang="en-US" sz="4800" dirty="0"/>
-              <a:t>ii)</a:t>
-            </a:r>
-            <a:r>
-              <a:rPr lang="en-US" sz="5400" dirty="0"/>
-              <a:t>                </a:t>
-            </a:r>
-            <a:r>
-              <a:rPr lang="en-US" sz="5400" dirty="0" smtClean="0"/>
-              <a:t> </a:t>
-            </a:r>
-            <a:r>
-              <a:rPr lang="en-US" sz="4800" dirty="0" smtClean="0"/>
-              <a:t>is a </a:t>
-            </a:r>
-            <a:r>
-              <a:rPr lang="en-US" sz="4800" dirty="0" err="1" smtClean="0">
-                <a:solidFill>
-                  <a:srgbClr val="008000"/>
-                </a:solidFill>
-              </a:rPr>
-              <a:t>css</a:t>
-            </a:r>
-            <a:endParaRPr lang="en-US" sz="4800" dirty="0">
-              <a:solidFill>
-                <a:srgbClr val="008000"/>
-              </a:solidFill>
-            </a:endParaRPr>
-          </a:p>
-          <a:p>
-            <a:pPr marL="571500" indent="-571500">
-              <a:buFont typeface="Arial"/>
-              <a:buChar char="•"/>
-            </a:pPr>
-            <a:endParaRPr lang="en-US" sz="4400" b="1" dirty="0">
-              <a:solidFill>
-                <a:srgbClr val="0000F1"/>
-              </a:solidFill>
-              <a:latin typeface="Euclid Symbol" charset="2"/>
-              <a:cs typeface="Euclid Symbol" charset="2"/>
-            </a:endParaRPr>
-          </a:p>
-          <a:p>
-            <a:endParaRPr lang="en-US" sz="4800" dirty="0" smtClean="0"/>
-          </a:p>
-        </p:txBody>
-      </p:sp>
-      <p:sp>
-        <p:nvSpPr>
-          <p:cNvPr id="4" name="Slide Number Placeholder 3"/>
-          <p:cNvSpPr>
-            <a:spLocks noGrp="1"/>
-          </p:cNvSpPr>
-          <p:nvPr>
-            <p:ph type="sldNum" sz="quarter" idx="4"/>
-          </p:nvPr>
-        </p:nvSpPr>
-        <p:spPr>
-          <a:xfrm>
-            <a:off x="8225613" y="6553200"/>
-            <a:ext cx="870764" cy="246221"/>
-          </a:xfrm>
-        </p:spPr>
-        <p:txBody>
-          <a:bodyPr/>
-          <a:lstStyle/>
-          <a:p>
-            <a:pPr>
-              <a:defRPr/>
-            </a:pPr>
-            <a:r>
-              <a:rPr lang="en-US" dirty="0" smtClean="0"/>
-              <a:t>min-gray.</a:t>
-            </a:r>
-            <a:fld id="{D7F2FC53-1536-41A9-A9C1-2199CF803E30}" type="slidenum">
-              <a:rPr lang="en-US" smtClean="0"/>
-              <a:pPr>
-                <a:defRPr/>
-              </a:pPr>
-              <a:t>12</a:t>
-            </a:fld>
-            <a:endParaRPr lang="en-US" dirty="0"/>
-          </a:p>
-        </p:txBody>
-      </p:sp>
-      <p:graphicFrame>
-        <p:nvGraphicFramePr>
-          <p:cNvPr id="5" name="Object 4"/>
-          <p:cNvGraphicFramePr>
-            <a:graphicFrameLocks noChangeAspect="1"/>
-          </p:cNvGraphicFramePr>
-          <p:nvPr>
-            <p:extLst>
-              <p:ext uri="{D42A27DB-BD31-4B8C-83A1-F6EECF244321}">
-                <p14:modId xmlns:p14="http://schemas.microsoft.com/office/powerpoint/2010/main" val="467001632"/>
-              </p:ext>
-            </p:extLst>
-          </p:nvPr>
-        </p:nvGraphicFramePr>
-        <p:xfrm>
-          <a:off x="1726275" y="5267325"/>
-          <a:ext cx="3150525" cy="1133475"/>
-        </p:xfrm>
-        <a:graphic>
-          <a:graphicData uri="http://schemas.openxmlformats.org/presentationml/2006/ole">
-            <mc:AlternateContent xmlns:mc="http://schemas.openxmlformats.org/markup-compatibility/2006">
-              <mc:Choice xmlns:v="urn:schemas-microsoft-com:vml" Requires="v">
-                <p:oleObj spid="_x0000_s54286" name="Equation" r:id="rId3" imgW="635000" imgH="228600" progId="Equation.DSMT4">
-                  <p:embed/>
-                </p:oleObj>
-              </mc:Choice>
-              <mc:Fallback>
-                <p:oleObj name="Equation" r:id="rId3" imgW="635000" imgH="228600" progId="Equation.DSMT4">
-                  <p:embed/>
-                  <p:pic>
-                    <p:nvPicPr>
-                      <p:cNvPr id="0" name=""/>
-                      <p:cNvPicPr/>
-                      <p:nvPr/>
-                    </p:nvPicPr>
-                    <p:blipFill>
-                      <a:blip r:embed="rId4"/>
-                      <a:stretch>
-                        <a:fillRect/>
-                      </a:stretch>
-                    </p:blipFill>
-                    <p:spPr>
-                      <a:xfrm>
-                        <a:off x="1726275" y="5267325"/>
-                        <a:ext cx="3150525" cy="1133475"/>
-                      </a:xfrm>
-                      <a:prstGeom prst="rect">
-                        <a:avLst/>
-                      </a:prstGeom>
-                    </p:spPr>
-                  </p:pic>
-                </p:oleObj>
-              </mc:Fallback>
-            </mc:AlternateContent>
-          </a:graphicData>
-        </a:graphic>
-      </p:graphicFrame>
-    </p:spTree>
-    <p:extLst>
-      <p:ext uri="{BB962C8B-B14F-4D97-AF65-F5344CB8AC3E}">
-        <p14:creationId xmlns:p14="http://schemas.microsoft.com/office/powerpoint/2010/main" val="4247411724"/>
-      </p:ext>
-    </p:extLst>
-  </p:cSld>
-  <p:clrMapOvr>
-    <a:masterClrMapping/>
-  </p:clrMapOvr>
-  <mc:AlternateContent xmlns:mc="http://schemas.openxmlformats.org/markup-compatibility/2006">
-    <mc:Choice xmlns:p14="http://schemas.microsoft.com/office/powerpoint/2010/main" Requires="p14">
-      <p:transition p14:dur="0" advClick="0"/>
-    </mc:Choice>
-    <mc:Fallback>
-      <p:transition xmlns:p14="http://schemas.microsoft.com/office/powerpoint/2010/main" advClick="0"/>
-    </mc:Fallback>
-  </mc:AlternateContent>
-  <p:timing>
-    <p:tnLst>
-      <p:par>
-        <p:cTn xmlns:p14="http://schemas.microsoft.com/office/powerpoint/2010/main" id="1" dur="indefinite" restart="never" nodeType="tmRoot">
-          <p:childTnLst>
-            <p:seq concurrent="1" nextAc="seek">
-              <p:cTn id="2" dur="indefinite" nodeType="mainSeq">
-                <p:childTnLst>
-                  <p:par>
-                    <p:cTn id="3" fill="hold">
-                      <p:stCondLst>
-                        <p:cond delay="indefinite"/>
-                        <p:cond evt="onBegin" delay="0">
-                          <p:tn val="2"/>
-                        </p:cond>
-                      </p:stCondLst>
-                      <p:childTnLst>
-                        <p:par>
-                          <p:cTn id="4" fill="hold">
-                            <p:stCondLst>
-                              <p:cond delay="0"/>
-                            </p:stCondLst>
-                            <p:childTnLst>
-                              <p:par>
-                                <p:cTn id="5" presetID="10" presetClass="entr" presetSubtype="0" fill="hold" nodeType="withEffect">
-                                  <p:stCondLst>
-                                    <p:cond delay="0"/>
-                                  </p:stCondLst>
-                                  <p:childTnLst>
-                                    <p:set>
-                                      <p:cBhvr>
-                                        <p:cTn id="6" dur="1" fill="hold">
-                                          <p:stCondLst>
-                                            <p:cond delay="0"/>
-                                          </p:stCondLst>
-                                        </p:cTn>
-                                        <p:tgtEl>
-                                          <p:spTgt spid="3">
-                                            <p:txEl>
-                                              <p:pRg st="1" end="1"/>
-                                            </p:txEl>
-                                          </p:spTgt>
-                                        </p:tgtEl>
-                                        <p:attrNameLst>
-                                          <p:attrName>style.visibility</p:attrName>
-                                        </p:attrNameLst>
-                                      </p:cBhvr>
-                                      <p:to>
-                                        <p:strVal val="visible"/>
-                                      </p:to>
-                                    </p:set>
-                                    <p:animEffect transition="in" filter="fade">
-                                      <p:cBhvr>
-                                        <p:cTn id="7" dur="500"/>
-                                        <p:tgtEl>
-                                          <p:spTgt spid="3">
-                                            <p:txEl>
-                                              <p:pRg st="1" end="1"/>
-                                            </p:txEl>
-                                          </p:spTgt>
-                                        </p:tgtEl>
-                                      </p:cBhvr>
-                                    </p:animEffect>
-                                  </p:childTnLst>
-                                </p:cTn>
-                              </p:par>
-                              <p:par>
-                                <p:cTn id="8" presetID="10" presetClass="entr" presetSubtype="0" fill="hold" nodeType="withEffect">
-                                  <p:stCondLst>
-                                    <p:cond delay="0"/>
-                                  </p:stCondLst>
-                                  <p:childTnLst>
-                                    <p:set>
-                                      <p:cBhvr>
-                                        <p:cTn id="9" dur="1" fill="hold">
-                                          <p:stCondLst>
-                                            <p:cond delay="0"/>
-                                          </p:stCondLst>
-                                        </p:cTn>
-                                        <p:tgtEl>
-                                          <p:spTgt spid="3">
-                                            <p:txEl>
-                                              <p:pRg st="2" end="2"/>
-                                            </p:txEl>
-                                          </p:spTgt>
-                                        </p:tgtEl>
-                                        <p:attrNameLst>
-                                          <p:attrName>style.visibility</p:attrName>
-                                        </p:attrNameLst>
-                                      </p:cBhvr>
-                                      <p:to>
-                                        <p:strVal val="visible"/>
-                                      </p:to>
-                                    </p:set>
-                                    <p:animEffect transition="in" filter="fade">
-                                      <p:cBhvr>
-                                        <p:cTn id="10" dur="500"/>
-                                        <p:tgtEl>
-                                          <p:spTgt spid="3">
-                                            <p:txEl>
-                                              <p:pRg st="2" end="2"/>
-                                            </p:txEl>
-                                          </p:spTgt>
-                                        </p:tgtEl>
-                                      </p:cBhvr>
-                                    </p:animEffect>
-                                  </p:childTnLst>
-                                </p:cTn>
-                              </p:par>
-                            </p:childTnLst>
-                          </p:cTn>
-                        </p:par>
-                      </p:childTnLst>
-                    </p:cTn>
-                  </p:par>
-                  <p:par>
-                    <p:cTn id="11" fill="hold">
-                      <p:stCondLst>
-                        <p:cond delay="indefinite"/>
-                      </p:stCondLst>
-                      <p:childTnLst>
-                        <p:par>
-                          <p:cTn id="12" fill="hold">
-                            <p:stCondLst>
-                              <p:cond delay="0"/>
-                            </p:stCondLst>
-                            <p:childTnLst>
-                              <p:par>
-                                <p:cTn id="13" presetID="22" presetClass="entr" presetSubtype="8" fill="hold" nodeType="clickEffect">
-                                  <p:stCondLst>
-                                    <p:cond delay="0"/>
-                                  </p:stCondLst>
-                                  <p:childTnLst>
-                                    <p:set>
-                                      <p:cBhvr>
-                                        <p:cTn id="14" dur="1" fill="hold">
-                                          <p:stCondLst>
-                                            <p:cond delay="0"/>
-                                          </p:stCondLst>
-                                        </p:cTn>
-                                        <p:tgtEl>
-                                          <p:spTgt spid="3">
-                                            <p:txEl>
-                                              <p:pRg st="3" end="3"/>
-                                            </p:txEl>
-                                          </p:spTgt>
-                                        </p:tgtEl>
-                                        <p:attrNameLst>
-                                          <p:attrName>style.visibility</p:attrName>
-                                        </p:attrNameLst>
-                                      </p:cBhvr>
-                                      <p:to>
-                                        <p:strVal val="visible"/>
-                                      </p:to>
-                                    </p:set>
-                                    <p:animEffect transition="in" filter="wipe(left)">
-                                      <p:cBhvr>
-                                        <p:cTn id="15" dur="1000"/>
-                                        <p:tgtEl>
-                                          <p:spTgt spid="3">
-                                            <p:txEl>
-                                              <p:pRg st="3" end="3"/>
-                                            </p:txEl>
-                                          </p:spTgt>
-                                        </p:tgtEl>
-                                      </p:cBhvr>
-                                    </p:animEffect>
-                                  </p:childTnLst>
-                                </p:cTn>
-                              </p:par>
-                            </p:childTnLst>
-                          </p:cTn>
-                        </p:par>
-                      </p:childTnLst>
-                    </p:cTn>
-                  </p:par>
-                  <p:par>
-                    <p:cTn id="16" fill="hold">
-                      <p:stCondLst>
-                        <p:cond delay="indefinite"/>
-                      </p:stCondLst>
-                      <p:childTnLst>
-                        <p:par>
-                          <p:cTn id="17" fill="hold">
-                            <p:stCondLst>
-                              <p:cond delay="0"/>
-                            </p:stCondLst>
-                            <p:childTnLst>
-                              <p:par>
-                                <p:cTn id="18" presetID="22" presetClass="entr" presetSubtype="8" fill="hold" nodeType="clickEffect">
-                                  <p:stCondLst>
-                                    <p:cond delay="0"/>
-                                  </p:stCondLst>
-                                  <p:childTnLst>
-                                    <p:set>
-                                      <p:cBhvr>
-                                        <p:cTn id="19" dur="1" fill="hold">
-                                          <p:stCondLst>
-                                            <p:cond delay="0"/>
-                                          </p:stCondLst>
-                                        </p:cTn>
-                                        <p:tgtEl>
-                                          <p:spTgt spid="5"/>
-                                        </p:tgtEl>
-                                        <p:attrNameLst>
-                                          <p:attrName>style.visibility</p:attrName>
-                                        </p:attrNameLst>
-                                      </p:cBhvr>
-                                      <p:to>
-                                        <p:strVal val="visible"/>
-                                      </p:to>
-                                    </p:set>
-                                    <p:animEffect transition="in" filter="wipe(left)">
-                                      <p:cBhvr>
-                                        <p:cTn id="20" dur="1000"/>
-                                        <p:tgtEl>
-                                          <p:spTgt spid="5"/>
-                                        </p:tgtEl>
-                                      </p:cBhvr>
-                                    </p:animEffect>
-                                  </p:childTnLst>
-                                </p:cTn>
-                              </p:par>
-                              <p:par>
-                                <p:cTn id="21" presetID="22" presetClass="entr" presetSubtype="8" fill="hold" nodeType="withEffect">
-                                  <p:stCondLst>
-                                    <p:cond delay="0"/>
-                                  </p:stCondLst>
-                                  <p:childTnLst>
-                                    <p:set>
-                                      <p:cBhvr>
-                                        <p:cTn id="22" dur="1" fill="hold">
-                                          <p:stCondLst>
-                                            <p:cond delay="0"/>
-                                          </p:stCondLst>
-                                        </p:cTn>
-                                        <p:tgtEl>
-                                          <p:spTgt spid="3">
-                                            <p:txEl>
-                                              <p:pRg st="4" end="4"/>
-                                            </p:txEl>
-                                          </p:spTgt>
-                                        </p:tgtEl>
-                                        <p:attrNameLst>
-                                          <p:attrName>style.visibility</p:attrName>
-                                        </p:attrNameLst>
-                                      </p:cBhvr>
-                                      <p:to>
-                                        <p:strVal val="visible"/>
-                                      </p:to>
-                                    </p:set>
-                                    <p:animEffect transition="in" filter="wipe(left)">
-                                      <p:cBhvr>
-                                        <p:cTn id="23" dur="1000"/>
-                                        <p:tgtEl>
-                                          <p:spTgt spid="3">
-                                            <p:txEl>
-                                              <p:pRg st="4" end="4"/>
-                                            </p:txEl>
-                                          </p:spTgt>
-                                        </p:tgtEl>
-                                      </p:cBhvr>
-                                    </p:animEffect>
-                                  </p:childTnLst>
-                                </p:cTn>
-                              </p:par>
-                            </p:childTnLst>
-                          </p:cTn>
-                        </p:par>
-                      </p:childTnLst>
-                    </p:cTn>
-                  </p:par>
-                </p:childTnLst>
-              </p:cTn>
-              <p:prevCondLst>
-                <p:cond evt="onPrev" delay="0">
-                  <p:tgtEl>
-                    <p:sldTgt/>
-                  </p:tgtEl>
-                </p:cond>
-              </p:prevCondLst>
-              <p:nextCondLst>
-                <p:cond evt="onNext" delay="0">
-                  <p:tgtEl>
-                    <p:sldTgt/>
-                  </p:tgtEl>
-                </p:cond>
-              </p:nextCondLst>
-            </p:seq>
-          </p:childTnLst>
-        </p:cTn>
-      </p:par>
-    </p:tnLst>
-  </p:timing>
-</p:sld>
-</file>
-
-<file path=ppt/slides/slide13.xml><?xml version="1.0" encoding="utf-8"?>
 <p:sld xmlns:a="http://schemas.openxmlformats.org/drawingml/2006/main" xmlns:r="http://schemas.openxmlformats.org/officeDocument/2006/relationships" xmlns:p="http://schemas.openxmlformats.org/presentationml/2006/main">
   <p:cSld>
     <p:spTree>
@@ -5124,7 +4402,7 @@
         <p:spPr>
           <a:xfrm>
             <a:off x="152400" y="1447800"/>
-            <a:ext cx="8763000" cy="4038600"/>
+            <a:ext cx="8763000" cy="4267200"/>
           </a:xfrm>
         </p:spPr>
         <p:txBody>
@@ -5132,167 +4410,20 @@
           <a:lstStyle/>
           <a:p>
             <a:r>
-              <a:rPr lang="en-US" sz="5400" dirty="0"/>
-              <a:t>f</a:t>
-            </a:r>
-            <a:r>
-              <a:rPr lang="en-US" sz="5400" dirty="0" smtClean="0"/>
-              <a:t>ollows from Swap Lemma:</a:t>
-            </a:r>
-          </a:p>
-          <a:p>
-            <a:r>
-              <a:rPr lang="en-US" sz="5400" dirty="0" smtClean="0"/>
-              <a:t>If </a:t>
-            </a:r>
-            <a:r>
-              <a:rPr lang="en-US" sz="5400" dirty="0" err="1" smtClean="0">
+              <a:rPr lang="en-US" sz="5400" dirty="0" smtClean="0">
                 <a:solidFill>
-                  <a:srgbClr val="0000F1"/>
+                  <a:srgbClr val="FF00FF"/>
                 </a:solidFill>
               </a:rPr>
-              <a:t>wt</a:t>
-            </a:r>
-            <a:r>
-              <a:rPr lang="en-US" sz="5400" dirty="0" smtClean="0">
-                <a:solidFill>
-                  <a:srgbClr val="0000F1"/>
-                </a:solidFill>
-              </a:rPr>
-              <a:t>(</a:t>
-            </a:r>
-            <a:r>
-              <a:rPr lang="en-US" sz="5400" b="1" i="1" dirty="0">
-                <a:ln w="12700">
-                  <a:solidFill>
-                    <a:srgbClr val="000000">
-                      <a:satMod val="155000"/>
-                    </a:srgbClr>
-                  </a:solidFill>
-                  <a:prstDash val="solid"/>
-                </a:ln>
-                <a:solidFill>
-                  <a:srgbClr val="808080">
-                    <a:tint val="85000"/>
-                    <a:satMod val="155000"/>
-                  </a:srgbClr>
-                </a:solidFill>
-                <a:effectLst>
-                  <a:outerShdw blurRad="41275" dist="20320" dir="1800000" algn="tl" rotWithShape="0">
-                    <a:srgbClr val="000000">
-                      <a:alpha val="40000"/>
-                    </a:srgbClr>
-                  </a:outerShdw>
-                </a:effectLst>
-                <a:latin typeface="PT Serif"/>
-                <a:cs typeface="PT Serif"/>
-              </a:rPr>
-              <a:t>e</a:t>
-            </a:r>
-            <a:r>
-              <a:rPr lang="en-US" sz="5400" dirty="0" smtClean="0">
-                <a:solidFill>
-                  <a:srgbClr val="0000F1"/>
-                </a:solidFill>
-              </a:rPr>
-              <a:t>) </a:t>
-            </a:r>
-            <a:r>
-              <a:rPr lang="en-US" sz="5400" b="1" dirty="0" smtClean="0">
-                <a:solidFill>
-                  <a:srgbClr val="0000F1"/>
-                </a:solidFill>
-                <a:latin typeface="Euclid Symbol" charset="2"/>
-                <a:cs typeface="Euclid Symbol" charset="2"/>
-              </a:rPr>
-              <a:t>&lt; </a:t>
-            </a:r>
-            <a:r>
-              <a:rPr lang="en-US" sz="5400" dirty="0" err="1" smtClean="0">
-                <a:solidFill>
-                  <a:srgbClr val="0000F1"/>
-                </a:solidFill>
-              </a:rPr>
-              <a:t>wt</a:t>
-            </a:r>
-            <a:r>
-              <a:rPr lang="en-US" sz="5400" dirty="0" smtClean="0">
-                <a:solidFill>
-                  <a:srgbClr val="0000F1"/>
-                </a:solidFill>
-              </a:rPr>
-              <a:t>(</a:t>
-            </a:r>
-            <a:r>
-              <a:rPr lang="en-US" sz="5400" dirty="0">
-                <a:solidFill>
-                  <a:srgbClr val="0000F1"/>
-                </a:solidFill>
-              </a:rPr>
-              <a:t>g</a:t>
-            </a:r>
-            <a:r>
-              <a:rPr lang="en-US" sz="5400" dirty="0" smtClean="0">
-                <a:solidFill>
-                  <a:srgbClr val="0000F1"/>
-                </a:solidFill>
-              </a:rPr>
-              <a:t>)</a:t>
-            </a:r>
-            <a:r>
-              <a:rPr lang="en-US" sz="5400" dirty="0" smtClean="0">
-                <a:solidFill>
-                  <a:srgbClr val="0D0D0D"/>
-                </a:solidFill>
-              </a:rPr>
-              <a:t>, then</a:t>
-            </a:r>
-          </a:p>
-          <a:p>
-            <a:r>
-              <a:rPr lang="en-US" sz="5400" dirty="0" smtClean="0">
-                <a:solidFill>
-                  <a:srgbClr val="0000F1"/>
-                </a:solidFill>
-              </a:rPr>
-              <a:t> </a:t>
-            </a:r>
-            <a:r>
-              <a:rPr lang="en-US" sz="5700" dirty="0" err="1" smtClean="0">
-                <a:solidFill>
-                  <a:srgbClr val="0000F1"/>
-                </a:solidFill>
-              </a:rPr>
-              <a:t>wt</a:t>
-            </a:r>
-            <a:r>
-              <a:rPr lang="en-US" sz="5700" dirty="0" smtClean="0">
-                <a:solidFill>
-                  <a:srgbClr val="0000F1"/>
-                </a:solidFill>
-              </a:rPr>
-              <a:t>(               ) </a:t>
-            </a:r>
-            <a:r>
-              <a:rPr lang="en-US" sz="5700" b="1" dirty="0" smtClean="0">
-                <a:solidFill>
-                  <a:srgbClr val="0000F1"/>
-                </a:solidFill>
-                <a:latin typeface="Euclid Symbol" charset="2"/>
-                <a:cs typeface="Euclid Symbol" charset="2"/>
-              </a:rPr>
-              <a:t>&lt; </a:t>
-            </a:r>
-            <a:r>
-              <a:rPr lang="en-US" sz="5700" dirty="0" err="1" smtClean="0">
-                <a:solidFill>
-                  <a:srgbClr val="0000F1"/>
-                </a:solidFill>
-                <a:latin typeface="Comic Sans MS"/>
-                <a:cs typeface="Comic Sans MS"/>
-              </a:rPr>
-              <a:t>wt</a:t>
-            </a:r>
+              <a:t>Swap</a:t>
+            </a:r>
+            <a:r>
+              <a:rPr lang="en-US" sz="5400" dirty="0" smtClean="0"/>
+              <a:t> Lemma implies:</a:t>
+            </a:r>
+            <a:endParaRPr lang="en-US" sz="5400" dirty="0" smtClean="0"/>
+          </a:p>
+          <a:p>
             <a:r>
               <a:rPr lang="en-US" sz="5700" dirty="0" smtClean="0">
                 <a:solidFill>
@@ -5301,19 +4432,17 @@
                 <a:latin typeface="Comic Sans MS"/>
                 <a:cs typeface="Comic Sans MS"/>
               </a:rPr>
-              <a:t>(C),</a:t>
-            </a:r>
-          </a:p>
-          <a:p>
+              <a:t>   C </a:t>
+            </a:r>
             <a:r>
               <a:rPr lang="en-US" sz="5700" dirty="0" smtClean="0">
                 <a:solidFill>
-                  <a:srgbClr val="0D0D0D"/>
+                  <a:srgbClr val="000000"/>
                 </a:solidFill>
                 <a:latin typeface="Comic Sans MS"/>
                 <a:cs typeface="Comic Sans MS"/>
               </a:rPr>
-              <a:t>so</a:t>
+              <a:t>is</a:t>
             </a:r>
             <a:r>
               <a:rPr lang="en-US" sz="5700" dirty="0" smtClean="0">
@@ -5323,7 +4452,7 @@
                 <a:latin typeface="Comic Sans MS"/>
                 <a:cs typeface="Comic Sans MS"/>
               </a:rPr>
-              <a:t> C </a:t>
+              <a:t> </a:t>
             </a:r>
             <a:r>
               <a:rPr lang="en-US" sz="5700" dirty="0" smtClean="0">
@@ -5336,8 +4465,47 @@
                 <a:latin typeface="Comic Sans MS"/>
                 <a:cs typeface="Comic Sans MS"/>
               </a:rPr>
-              <a:t>not minimum.</a:t>
-            </a:r>
+              <a:t>not minimum </a:t>
+            </a:r>
+            <a:r>
+              <a:rPr lang="en-US" sz="5700" dirty="0" err="1" smtClean="0">
+                <a:solidFill>
+                  <a:srgbClr val="008000"/>
+                </a:solidFill>
+                <a:latin typeface="Comic Sans MS"/>
+                <a:cs typeface="Comic Sans MS"/>
+              </a:rPr>
+              <a:t>css</a:t>
+            </a:r>
+            <a:endParaRPr lang="en-US" sz="5700" dirty="0" smtClean="0">
+              <a:solidFill>
+                <a:srgbClr val="008000"/>
+              </a:solidFill>
+              <a:latin typeface="Comic Sans MS"/>
+              <a:cs typeface="Comic Sans MS"/>
+            </a:endParaRPr>
+          </a:p>
+          <a:p>
+            <a:r>
+              <a:rPr lang="en-US" sz="5700" dirty="0" smtClean="0">
+                <a:latin typeface="Comic Sans MS"/>
+                <a:cs typeface="Comic Sans MS"/>
+              </a:rPr>
+              <a:t>because                  has</a:t>
+            </a:r>
+          </a:p>
+          <a:p>
+            <a:r>
+              <a:rPr lang="en-US" sz="5700" dirty="0" smtClean="0">
+                <a:latin typeface="Comic Sans MS"/>
+                <a:cs typeface="Comic Sans MS"/>
+              </a:rPr>
+              <a:t>smaller weight.</a:t>
+            </a:r>
+            <a:endParaRPr lang="en-US" sz="5700" dirty="0" smtClean="0">
+              <a:latin typeface="Comic Sans MS"/>
+              <a:cs typeface="Comic Sans MS"/>
+            </a:endParaRPr>
           </a:p>
         </p:txBody>
       </p:sp>
@@ -5373,7 +4541,7 @@
               <a:pPr>
                 <a:defRPr/>
               </a:pPr>
-              <a:t>13</a:t>
+              <a:t>12</a:t>
             </a:fld>
             <a:endParaRPr lang="en-US" dirty="0"/>
           </a:p>
@@ -5388,20 +4556,20 @@
           <p:nvPr>
             <p:extLst>
               <p:ext uri="{D42A27DB-BD31-4B8C-83A1-F6EECF244321}">
-                <p14:modId xmlns:p14="http://schemas.microsoft.com/office/powerpoint/2010/main" val="2557107078"/>
+                <p14:modId xmlns:p14="http://schemas.microsoft.com/office/powerpoint/2010/main" val="539617770"/>
               </p:ext>
             </p:extLst>
           </p:nvPr>
         </p:nvGraphicFramePr>
         <p:xfrm>
-          <a:off x="1524000" y="3429000"/>
+          <a:off x="3200400" y="3410335"/>
           <a:ext cx="3362325" cy="1209675"/>
         </p:xfrm>
         <a:graphic>
           <a:graphicData uri="http://schemas.openxmlformats.org/presentationml/2006/ole">
             <mc:AlternateContent xmlns:mc="http://schemas.openxmlformats.org/markup-compatibility/2006">
               <mc:Choice xmlns:v="urn:schemas-microsoft-com:vml" Requires="v">
-                <p:oleObj spid="_x0000_s48157" name="Equation" r:id="rId3" imgW="635000" imgH="228600" progId="Equation.DSMT4">
+                <p:oleObj spid="_x0000_s48162" name="Equation" r:id="rId3" imgW="635000" imgH="228600" progId="Equation.DSMT4">
                   <p:embed/>
                 </p:oleObj>
               </mc:Choice>
@@ -5422,7 +4590,7 @@
                     </p:blipFill>
                     <p:spPr>
                       <a:xfrm>
-                        <a:off x="1524000" y="3429000"/>
+                        <a:off x="3200400" y="3410335"/>
                         <a:ext cx="3362325" cy="1209675"/>
                       </a:xfrm>
                       <a:prstGeom prst="rect">
@@ -5625,7 +4793,7 @@
                                     </p:set>
                                     <p:animEffect transition="in" filter="fade">
                                       <p:cBhvr>
-                                        <p:cTn id="12" dur="1000"/>
+                                        <p:cTn id="12" dur="500"/>
                                         <p:tgtEl>
                                           <p:spTgt spid="3">
                                             <p:txEl>
@@ -5673,33 +4841,15 @@
                                   </p:childTnLst>
                                 </p:cTn>
                               </p:par>
-                            </p:childTnLst>
-                          </p:cTn>
-                        </p:par>
-                      </p:childTnLst>
-                    </p:cTn>
-                  </p:par>
-                  <p:par>
-                    <p:cTn id="16" fill="hold">
-                      <p:stCondLst>
-                        <p:cond delay="indefinite"/>
-                      </p:stCondLst>
-                      <p:childTnLst>
-                        <p:par>
-                          <p:cTn id="17" fill="hold">
-                            <p:stCondLst>
-                              <p:cond delay="0"/>
-                            </p:stCondLst>
-                            <p:childTnLst>
                               <p:par>
-                                <p:cTn id="18" presetID="10" presetClass="entr" presetSubtype="0" fill="hold" nodeType="clickEffect">
+                                <p:cTn id="16" presetID="10" presetClass="entr" presetSubtype="0" fill="hold" nodeType="withEffect">
                                   <p:stCondLst>
                                     <p:cond delay="0"/>
                                   </p:stCondLst>
                                   <p:childTnLst>
                                     <p:set>
                                       <p:cBhvr>
-                                        <p:cTn id="19" dur="1" fill="hold">
+                                        <p:cTn id="17" dur="1" fill="hold">
                                           <p:stCondLst>
                                             <p:cond delay="0"/>
                                           </p:stCondLst>
@@ -5721,7 +4871,437 @@
                                     </p:set>
                                     <p:animEffect transition="in" filter="fade">
                                       <p:cBhvr>
-                                        <p:cTn id="20" dur="500"/>
+                                        <p:cTn id="18" dur="500"/>
+                                        <p:tgtEl>
+                                          <p:spTgt spid="3">
+                                            <p:txEl>
+                                              <p:pRg st="3" end="3"/>
+                                            </p:txEl>
+                                          </p:spTgt>
+                                        </p:tgtEl>
+                                      </p:cBhvr>
+                                    </p:animEffect>
+                                  </p:childTnLst>
+                                </p:cTn>
+                              </p:par>
+                            </p:childTnLst>
+                          </p:cTn>
+                        </p:par>
+                      </p:childTnLst>
+                    </p:cTn>
+                  </p:par>
+                </p:childTnLst>
+              </p:cTn>
+              <p:prevCondLst>
+                <p:cond evt="onPrev" delay="0">
+                  <p:tgtEl>
+                    <p:sldTgt/>
+                  </p:tgtEl>
+                </p:cond>
+              </p:prevCondLst>
+              <p:nextCondLst>
+                <p:cond evt="onNext" delay="0">
+                  <p:tgtEl>
+                    <p:sldTgt/>
+                  </p:tgtEl>
+                </p:cond>
+              </p:nextCondLst>
+            </p:seq>
+          </p:childTnLst>
+        </p:cTn>
+      </p:par>
+    </p:tnLst>
+  </p:timing>
+</p:sld>
+</file>
+
+<file path=ppt/slides/slide13.xml><?xml version="1.0" encoding="utf-8"?>
+<p:sld xmlns:a="http://schemas.openxmlformats.org/drawingml/2006/main" xmlns:r="http://schemas.openxmlformats.org/officeDocument/2006/relationships" xmlns:p="http://schemas.openxmlformats.org/presentationml/2006/main">
+  <p:cSld>
+    <p:spTree>
+      <p:nvGrpSpPr>
+        <p:cNvPr id="1" name=""/>
+        <p:cNvGrpSpPr/>
+        <p:nvPr/>
+      </p:nvGrpSpPr>
+      <p:grpSpPr>
+        <a:xfrm>
+          <a:off x="0" y="0"/>
+          <a:ext cx="0" cy="0"/>
+          <a:chOff x="0" y="0"/>
+          <a:chExt cx="0" cy="0"/>
+        </a:xfrm>
+      </p:grpSpPr>
+      <p:sp>
+        <p:nvSpPr>
+          <p:cNvPr id="3" name="Content Placeholder 2"/>
+          <p:cNvSpPr>
+            <a:spLocks noGrp="1"/>
+          </p:cNvSpPr>
+          <p:nvPr>
+            <p:ph idx="1"/>
+          </p:nvPr>
+        </p:nvSpPr>
+        <p:spPr>
+          <a:xfrm>
+            <a:off x="152400" y="1447800"/>
+            <a:ext cx="8915400" cy="4953000"/>
+          </a:xfrm>
+        </p:spPr>
+        <p:txBody>
+          <a:bodyPr/>
+          <a:lstStyle/>
+          <a:p>
+            <a:r>
+              <a:rPr lang="en-US" sz="5400" dirty="0" smtClean="0">
+                <a:solidFill>
+                  <a:srgbClr val="FF00FF"/>
+                </a:solidFill>
+              </a:rPr>
+              <a:t>Swap</a:t>
+            </a:r>
+            <a:r>
+              <a:rPr lang="en-US" sz="5400" dirty="0" smtClean="0"/>
+              <a:t> Lemma implies:</a:t>
+            </a:r>
+            <a:endParaRPr lang="en-US" sz="5400" dirty="0" smtClean="0"/>
+          </a:p>
+          <a:p>
+            <a:r>
+              <a:rPr lang="en-US" sz="5700" dirty="0" smtClean="0">
+                <a:solidFill>
+                  <a:srgbClr val="0000F1"/>
+                </a:solidFill>
+                <a:latin typeface="Comic Sans MS"/>
+                <a:cs typeface="Comic Sans MS"/>
+              </a:rPr>
+              <a:t>   C </a:t>
+            </a:r>
+            <a:r>
+              <a:rPr lang="en-US" sz="5700" dirty="0" smtClean="0">
+                <a:solidFill>
+                  <a:srgbClr val="000000"/>
+                </a:solidFill>
+                <a:latin typeface="Comic Sans MS"/>
+                <a:cs typeface="Comic Sans MS"/>
+              </a:rPr>
+              <a:t>is</a:t>
+            </a:r>
+            <a:r>
+              <a:rPr lang="en-US" sz="5700" dirty="0" smtClean="0">
+                <a:solidFill>
+                  <a:srgbClr val="0000F1"/>
+                </a:solidFill>
+                <a:latin typeface="Comic Sans MS"/>
+                <a:cs typeface="Comic Sans MS"/>
+              </a:rPr>
+              <a:t> </a:t>
+            </a:r>
+            <a:r>
+              <a:rPr lang="en-US" sz="5700" dirty="0" smtClean="0">
+                <a:solidFill>
+                  <a:schemeClr val="tx1">
+                    <a:lumMod val="95000"/>
+                    <a:lumOff val="5000"/>
+                  </a:schemeClr>
+                </a:solidFill>
+                <a:latin typeface="Comic Sans MS"/>
+                <a:cs typeface="Comic Sans MS"/>
+              </a:rPr>
+              <a:t>not minimum </a:t>
+            </a:r>
+            <a:r>
+              <a:rPr lang="en-US" sz="5700" dirty="0" err="1" smtClean="0">
+                <a:solidFill>
+                  <a:srgbClr val="008000"/>
+                </a:solidFill>
+                <a:latin typeface="Comic Sans MS"/>
+                <a:cs typeface="Comic Sans MS"/>
+              </a:rPr>
+              <a:t>css</a:t>
+            </a:r>
+            <a:r>
+              <a:rPr lang="en-US" sz="5700" dirty="0" smtClean="0">
+                <a:solidFill>
+                  <a:srgbClr val="000000"/>
+                </a:solidFill>
+                <a:latin typeface="Comic Sans MS"/>
+                <a:cs typeface="Comic Sans MS"/>
+              </a:rPr>
+              <a:t>.</a:t>
+            </a:r>
+          </a:p>
+          <a:p>
+            <a:r>
+              <a:rPr lang="en-US" sz="5700" dirty="0" smtClean="0">
+                <a:solidFill>
+                  <a:srgbClr val="000000"/>
+                </a:solidFill>
+                <a:latin typeface="Comic Sans MS"/>
+                <a:cs typeface="Comic Sans MS"/>
+              </a:rPr>
+              <a:t>So </a:t>
+            </a:r>
+            <a:r>
+              <a:rPr lang="en-US" sz="6000" b="1" i="1" dirty="0" smtClean="0">
+                <a:ln w="12700">
+                  <a:solidFill>
+                    <a:schemeClr val="tx2">
+                      <a:satMod val="155000"/>
+                    </a:schemeClr>
+                  </a:solidFill>
+                  <a:prstDash val="solid"/>
+                </a:ln>
+                <a:solidFill>
+                  <a:schemeClr val="bg2">
+                    <a:tint val="85000"/>
+                    <a:satMod val="155000"/>
+                  </a:schemeClr>
+                </a:solidFill>
+                <a:effectLst>
+                  <a:outerShdw blurRad="41275" dist="20320" dir="1800000" algn="tl" rotWithShape="0">
+                    <a:srgbClr val="000000">
+                      <a:alpha val="40000"/>
+                    </a:srgbClr>
+                  </a:outerShdw>
+                </a:effectLst>
+                <a:latin typeface="PT Serif"/>
+                <a:cs typeface="PT Serif"/>
+              </a:rPr>
+              <a:t>e </a:t>
+            </a:r>
+            <a:r>
+              <a:rPr lang="en-US" sz="5400" dirty="0"/>
+              <a:t>must be in </a:t>
+            </a:r>
+            <a:r>
+              <a:rPr lang="en-US" sz="5400" dirty="0" smtClean="0"/>
+              <a:t>MST.</a:t>
+            </a:r>
+          </a:p>
+          <a:p>
+            <a:r>
+              <a:rPr lang="en-US" sz="5400" dirty="0" smtClean="0"/>
+              <a:t>That is, </a:t>
+            </a:r>
+            <a:r>
+              <a:rPr lang="en-US" sz="5400" b="1" i="1" dirty="0">
+                <a:ln w="12700">
+                  <a:solidFill>
+                    <a:schemeClr val="tx2">
+                      <a:satMod val="155000"/>
+                    </a:schemeClr>
+                  </a:solidFill>
+                  <a:prstDash val="solid"/>
+                </a:ln>
+                <a:solidFill>
+                  <a:schemeClr val="bg2">
+                    <a:tint val="85000"/>
+                    <a:satMod val="155000"/>
+                  </a:schemeClr>
+                </a:solidFill>
+                <a:effectLst>
+                  <a:outerShdw blurRad="41275" dist="20320" dir="1800000" algn="tl" rotWithShape="0">
+                    <a:srgbClr val="000000">
+                      <a:alpha val="40000"/>
+                    </a:srgbClr>
+                  </a:outerShdw>
+                </a:effectLst>
+                <a:latin typeface="PT Serif"/>
+                <a:cs typeface="PT Serif"/>
+              </a:rPr>
+              <a:t>e </a:t>
+            </a:r>
+            <a:r>
+              <a:rPr lang="en-US" sz="5400" dirty="0"/>
+              <a:t>is</a:t>
+            </a:r>
+            <a:r>
+              <a:rPr lang="en-US" sz="5400" dirty="0" smtClean="0"/>
+              <a:t> </a:t>
+            </a:r>
+            <a:r>
+              <a:rPr lang="en-US" sz="5400" dirty="0" smtClean="0">
+                <a:solidFill>
+                  <a:srgbClr val="008000"/>
+                </a:solidFill>
+              </a:rPr>
+              <a:t>necessary</a:t>
+            </a:r>
+            <a:r>
+              <a:rPr lang="en-US" sz="5400" dirty="0" smtClean="0"/>
+              <a:t>.</a:t>
+            </a:r>
+          </a:p>
+        </p:txBody>
+      </p:sp>
+      <p:sp>
+        <p:nvSpPr>
+          <p:cNvPr id="4" name="Slide Number Placeholder 3"/>
+          <p:cNvSpPr>
+            <a:spLocks noGrp="1"/>
+          </p:cNvSpPr>
+          <p:nvPr>
+            <p:ph type="sldNum" sz="quarter" idx="4"/>
+          </p:nvPr>
+        </p:nvSpPr>
+        <p:spPr>
+          <a:xfrm>
+            <a:off x="8225613" y="6553200"/>
+            <a:ext cx="870764" cy="246221"/>
+          </a:xfrm>
+        </p:spPr>
+        <p:txBody>
+          <a:bodyPr/>
+          <a:lstStyle/>
+          <a:p>
+            <a:pPr>
+              <a:defRPr/>
+            </a:pPr>
+            <a:r>
+              <a:rPr lang="en-US" dirty="0" smtClean="0"/>
+              <a:t>min-gray.</a:t>
+            </a:r>
+            <a:fld id="{D7F2FC53-1536-41A9-A9C1-2199CF803E30}" type="slidenum">
+              <a:rPr lang="en-US" smtClean="0"/>
+              <a:pPr>
+                <a:defRPr/>
+              </a:pPr>
+              <a:t>13</a:t>
+            </a:fld>
+            <a:endParaRPr lang="en-US" dirty="0"/>
+          </a:p>
+        </p:txBody>
+      </p:sp>
+      <p:sp>
+        <p:nvSpPr>
+          <p:cNvPr id="8" name="Title 1"/>
+          <p:cNvSpPr>
+            <a:spLocks noGrp="1"/>
+          </p:cNvSpPr>
+          <p:nvPr>
+            <p:ph type="title"/>
+          </p:nvPr>
+        </p:nvSpPr>
+        <p:spPr>
+          <a:xfrm>
+            <a:off x="1219200" y="152400"/>
+            <a:ext cx="7848600" cy="1371600"/>
+          </a:xfrm>
+        </p:spPr>
+        <p:txBody>
+          <a:bodyPr/>
+          <a:lstStyle/>
+          <a:p>
+            <a:r>
+              <a:rPr lang="en-US" dirty="0" smtClean="0">
+                <a:solidFill>
+                  <a:schemeClr val="tx1"/>
+                </a:solidFill>
+              </a:rPr>
+              <a:t>M</a:t>
+            </a:r>
+            <a:r>
+              <a:rPr lang="en-US" dirty="0" smtClean="0"/>
+              <a:t>in </a:t>
+            </a:r>
+            <a:r>
+              <a:rPr lang="en-US" dirty="0"/>
+              <a:t>G</a:t>
+            </a:r>
+            <a:r>
+              <a:rPr lang="en-US" dirty="0" smtClean="0"/>
+              <a:t>ray Edge </a:t>
+            </a:r>
+            <a:r>
+              <a:rPr lang="en-US" dirty="0" smtClean="0">
+                <a:solidFill>
+                  <a:srgbClr val="008000"/>
+                </a:solidFill>
+              </a:rPr>
+              <a:t>Necessary</a:t>
+            </a:r>
+            <a:r>
+              <a:rPr lang="en-US" dirty="0" smtClean="0"/>
+              <a:t> </a:t>
+            </a:r>
+            <a:endParaRPr lang="en-US" dirty="0"/>
+          </a:p>
+        </p:txBody>
+      </p:sp>
+    </p:spTree>
+    <p:extLst>
+      <p:ext uri="{BB962C8B-B14F-4D97-AF65-F5344CB8AC3E}">
+        <p14:creationId xmlns:p14="http://schemas.microsoft.com/office/powerpoint/2010/main" val="2108613754"/>
+      </p:ext>
+    </p:extLst>
+  </p:cSld>
+  <p:clrMapOvr>
+    <a:masterClrMapping/>
+  </p:clrMapOvr>
+  <mc:AlternateContent xmlns:mc="http://schemas.openxmlformats.org/markup-compatibility/2006" xmlns:p14="http://schemas.microsoft.com/office/powerpoint/2010/main">
+    <mc:Choice Requires="p14">
+      <p:transition spd="med" p14:dur="700" advClick="0">
+        <p:fade/>
+      </p:transition>
+    </mc:Choice>
+    <mc:Fallback xmlns="">
+      <p:transition xmlns:p14="http://schemas.microsoft.com/office/powerpoint/2010/main" spd="med" advClick="0">
+        <p:fade/>
+      </p:transition>
+    </mc:Fallback>
+  </mc:AlternateContent>
+  <p:timing>
+    <p:tnLst>
+      <p:par>
+        <p:cTn xmlns:p14="http://schemas.microsoft.com/office/powerpoint/2010/main" id="1" dur="indefinite" restart="never" nodeType="tmRoot">
+          <p:childTnLst>
+            <p:seq concurrent="1" nextAc="seek">
+              <p:cTn id="2" dur="indefinite" nodeType="mainSeq">
+                <p:childTnLst>
+                  <p:par>
+                    <p:cTn id="3" fill="hold">
+                      <p:stCondLst>
+                        <p:cond delay="indefinite"/>
+                      </p:stCondLst>
+                      <p:childTnLst>
+                        <p:par>
+                          <p:cTn id="4" fill="hold">
+                            <p:stCondLst>
+                              <p:cond delay="0"/>
+                            </p:stCondLst>
+                            <p:childTnLst>
+                              <p:par>
+                                <p:cTn id="5" presetID="10" presetClass="entr" presetSubtype="0" fill="hold" nodeType="clickEffect">
+                                  <p:stCondLst>
+                                    <p:cond delay="0"/>
+                                  </p:stCondLst>
+                                  <p:childTnLst>
+                                    <p:set>
+                                      <p:cBhvr>
+                                        <p:cTn id="6" dur="1" fill="hold">
+                                          <p:stCondLst>
+                                            <p:cond delay="0"/>
+                                          </p:stCondLst>
+                                        </p:cTn>
+                                        <p:tgtEl>
+                                          <p:spTgt spid="3">
+                                            <p:txEl>
+                                              <p:pRg st="3" end="3"/>
+                                            </p:txEl>
+                                          </p:spTgt>
+                                        </p:tgtEl>
+                                        <p:attrNameLst>
+                                          <p:attrName>style.visibility</p:attrName>
+                                        </p:attrNameLst>
+                                      </p:cBhvr>
+                                      <p:to>
+                                        <p:strVal val="visible"/>
+                                      </p:to>
+                                    </p:set>
+                                    <p:animEffect transition="in" filter="fade">
+                                      <p:cBhvr>
+                                        <p:cTn id="7" dur="500"/>
                                         <p:tgtEl>
                                           <p:spTgt spid="3">
                                             <p:txEl>
@@ -5938,7 +5518,7 @@
           <a:graphicData uri="http://schemas.openxmlformats.org/presentationml/2006/ole">
             <mc:AlternateContent xmlns:mc="http://schemas.openxmlformats.org/markup-compatibility/2006">
               <mc:Choice xmlns:v="urn:schemas-microsoft-com:vml" Requires="v">
-                <p:oleObj spid="_x0000_s41006" name="Equation" r:id="rId3" imgW="1117600" imgH="152400" progId="Equation.DSMT4">
+                <p:oleObj spid="_x0000_s41011" name="Equation" r:id="rId3" imgW="1117600" imgH="152400" progId="Equation.DSMT4">
                   <p:embed/>
                 </p:oleObj>
               </mc:Choice>
@@ -5995,7 +5575,7 @@
           <a:graphicData uri="http://schemas.openxmlformats.org/presentationml/2006/ole">
             <mc:AlternateContent xmlns:mc="http://schemas.openxmlformats.org/markup-compatibility/2006">
               <mc:Choice xmlns:v="urn:schemas-microsoft-com:vml" Requires="v">
-                <p:oleObj spid="_x0000_s41007" name="Equation" r:id="rId5" imgW="889000" imgH="228600" progId="Equation.DSMT4">
+                <p:oleObj spid="_x0000_s41012" name="Equation" r:id="rId5" imgW="889000" imgH="228600" progId="Equation.DSMT4">
                   <p:embed/>
                 </p:oleObj>
               </mc:Choice>
@@ -17993,7 +17573,7 @@
           <a:graphicData uri="http://schemas.openxmlformats.org/presentationml/2006/ole">
             <mc:AlternateContent xmlns:mc="http://schemas.openxmlformats.org/markup-compatibility/2006">
               <mc:Choice xmlns:v="urn:schemas-microsoft-com:vml" Requires="v">
-                <p:oleObj spid="_x0000_s42011" name="Equation" r:id="rId3" imgW="393700" imgH="228600" progId="Equation.DSMT4">
+                <p:oleObj spid="_x0000_s42014" name="Equation" r:id="rId3" imgW="393700" imgH="228600" progId="Equation.DSMT4">
                   <p:embed/>
                 </p:oleObj>
               </mc:Choice>
@@ -21001,7 +20581,7 @@
           <a:graphicData uri="http://schemas.openxmlformats.org/presentationml/2006/ole">
             <mc:AlternateContent xmlns:mc="http://schemas.openxmlformats.org/markup-compatibility/2006">
               <mc:Choice xmlns:v="urn:schemas-microsoft-com:vml" Requires="v">
-                <p:oleObj spid="_x0000_s43035" name="Equation" r:id="rId3" imgW="635000" imgH="228600" progId="Equation.DSMT4">
+                <p:oleObj spid="_x0000_s43038" name="Equation" r:id="rId3" imgW="635000" imgH="228600" progId="Equation.DSMT4">
                   <p:embed/>
                 </p:oleObj>
               </mc:Choice>
@@ -21424,7 +21004,7 @@
             <a:graphicData uri="http://schemas.openxmlformats.org/presentationml/2006/ole">
               <mc:AlternateContent xmlns:mc="http://schemas.openxmlformats.org/markup-compatibility/2006">
                 <mc:Choice xmlns:v="urn:schemas-microsoft-com:vml" Requires="v">
-                  <p:oleObj spid="_x0000_s44059" name="Equation" r:id="rId3" imgW="635000" imgH="228600" progId="Equation.DSMT4">
+                  <p:oleObj spid="_x0000_s44062" name="Equation" r:id="rId3" imgW="635000" imgH="228600" progId="Equation.DSMT4">
                     <p:embed/>
                   </p:oleObj>
                 </mc:Choice>
@@ -23657,7 +23237,7 @@
           <a:graphicData uri="http://schemas.openxmlformats.org/presentationml/2006/ole">
             <mc:AlternateContent xmlns:mc="http://schemas.openxmlformats.org/markup-compatibility/2006">
               <mc:Choice xmlns:v="urn:schemas-microsoft-com:vml" Requires="v">
-                <p:oleObj spid="_x0000_s46107" name="Equation" r:id="rId3" imgW="635000" imgH="228600" progId="Equation.DSMT4">
+                <p:oleObj spid="_x0000_s46110" name="Equation" r:id="rId3" imgW="635000" imgH="228600" progId="Equation.DSMT4">
                   <p:embed/>
                 </p:oleObj>
               </mc:Choice>
@@ -28267,18 +27847,9 @@
   <p:clrMapOvr>
     <a:masterClrMapping/>
   </p:clrMapOvr>
-  <mc:AlternateContent xmlns:mc="http://schemas.openxmlformats.org/markup-compatibility/2006" xmlns:p14="http://schemas.microsoft.com/office/powerpoint/2010/main">
-    <mc:Choice Requires="p14">
-      <p:transition spd="slow" p14:dur="1100" advClick="0">
-        <p:fade thruBlk="1"/>
-      </p:transition>
-    </mc:Choice>
-    <mc:Fallback xmlns="">
-      <p:transition xmlns:p14="http://schemas.microsoft.com/office/powerpoint/2010/main" spd="slow" advClick="0">
-        <p:fade thruBlk="1"/>
-      </p:transition>
-    </mc:Fallback>
-  </mc:AlternateContent>
+  <p:transition xmlns:p14="http://schemas.microsoft.com/office/powerpoint/2010/main" spd="slow" advClick="0">
+    <p:fade/>
+  </p:transition>
   <p:timing>
     <p:tnLst>
       <p:par>
@@ -28325,7 +27896,7 @@
                                     </p:set>
                                     <p:animEffect transition="in" filter="wipe(left)">
                                       <p:cBhvr>
-                                        <p:cTn id="7" dur="1000"/>
+                                        <p:cTn id="7" dur="500"/>
                                         <p:tgtEl>
                                           <p:spTgt spid="5"/>
                                         </p:tgtEl>

</xml_diff>